<commit_message>
Comentario JavaDoc para doxygen
</commit_message>
<xml_diff>
--- a/manual de usuario/Qsudoku.pptx
+++ b/manual de usuario/Qsudoku.pptx
@@ -13789,6 +13789,13 @@
   <p:clrMapOvr>
     <a:masterClrMapping/>
   </p:clrMapOvr>
+  <p:timing>
+    <p:tnLst>
+      <p:par>
+        <p:cTn id="1" dur="indefinite" restart="never" nodeType="tmRoot"/>
+      </p:par>
+    </p:tnLst>
+  </p:timing>
 </p:sld>
 </file>
 
@@ -13907,6 +13914,13 @@
   <p:clrMapOvr>
     <a:masterClrMapping/>
   </p:clrMapOvr>
+  <p:timing>
+    <p:tnLst>
+      <p:par>
+        <p:cTn id="1" dur="indefinite" restart="never" nodeType="tmRoot"/>
+      </p:par>
+    </p:tnLst>
+  </p:timing>
 </p:sld>
 </file>
 
@@ -13989,6 +14003,13 @@
   <p:clrMapOvr>
     <a:masterClrMapping/>
   </p:clrMapOvr>
+  <p:timing>
+    <p:tnLst>
+      <p:par>
+        <p:cTn id="1" dur="indefinite" restart="never" nodeType="tmRoot"/>
+      </p:par>
+    </p:tnLst>
+  </p:timing>
 </p:sld>
 </file>
 
@@ -14032,25 +14053,35 @@
           </a:p>
         </p:txBody>
       </p:sp>
-      <p:sp>
-        <p:nvSpPr>
-          <p:cNvPr id="3" name="2 Marcador de contenido"/>
-          <p:cNvSpPr>
-            <a:spLocks noGrp="1"/>
-          </p:cNvSpPr>
+      <p:pic>
+        <p:nvPicPr>
+          <p:cNvPr id="4" name="3 Marcador de contenido"/>
+          <p:cNvPicPr>
+            <a:picLocks noGrp="1" noChangeAspect="1"/>
+          </p:cNvPicPr>
           <p:nvPr>
             <p:ph idx="1"/>
           </p:nvPr>
-        </p:nvSpPr>
-        <p:spPr/>
-        <p:txBody>
-          <a:bodyPr/>
-          <a:lstStyle/>
-          <a:p>
-            <a:endParaRPr lang="es-EC" dirty="0"/>
-          </a:p>
-        </p:txBody>
-      </p:sp>
+        </p:nvPicPr>
+        <p:blipFill>
+          <a:blip r:embed="rId2">
+            <a:extLst>
+              <a:ext uri="{28A0092B-C50C-407E-A947-70E740481C1C}">
+                <a14:useLocalDpi xmlns:a14="http://schemas.microsoft.com/office/drawing/2010/main" val="0"/>
+              </a:ext>
+            </a:extLst>
+          </a:blip>
+          <a:stretch>
+            <a:fillRect/>
+          </a:stretch>
+        </p:blipFill>
+        <p:spPr>
+          <a:xfrm>
+            <a:off x="2867647" y="2324100"/>
+            <a:ext cx="3127719" cy="3508375"/>
+          </a:xfrm>
+        </p:spPr>
+      </p:pic>
     </p:spTree>
     <p:extLst>
       <p:ext uri="{BB962C8B-B14F-4D97-AF65-F5344CB8AC3E}">
@@ -14061,6 +14092,13 @@
   <p:clrMapOvr>
     <a:masterClrMapping/>
   </p:clrMapOvr>
+  <p:timing>
+    <p:tnLst>
+      <p:par>
+        <p:cTn id="1" dur="indefinite" restart="never" nodeType="tmRoot"/>
+      </p:par>
+    </p:tnLst>
+  </p:timing>
 </p:sld>
 </file>
 
@@ -14143,6 +14181,13 @@
   <p:clrMapOvr>
     <a:masterClrMapping/>
   </p:clrMapOvr>
+  <p:timing>
+    <p:tnLst>
+      <p:par>
+        <p:cTn id="1" dur="indefinite" restart="never" nodeType="tmRoot"/>
+      </p:par>
+    </p:tnLst>
+  </p:timing>
 </p:sld>
 </file>
 
@@ -14238,6 +14283,13 @@
   <p:clrMapOvr>
     <a:masterClrMapping/>
   </p:clrMapOvr>
+  <p:timing>
+    <p:tnLst>
+      <p:par>
+        <p:cTn id="1" dur="indefinite" restart="never" nodeType="tmRoot"/>
+      </p:par>
+    </p:tnLst>
+  </p:timing>
 </p:sld>
 </file>
 

</xml_diff>